<commit_message>
added folder path to data.csv
</commit_message>
<xml_diff>
--- a/Flow_charts.pptx
+++ b/Flow_charts.pptx
@@ -124,7 +124,7 @@
 <file path=ppt/revisionInfo.xml><?xml version="1.0" encoding="utf-8"?>
 <p1510:revInfo xmlns:a="http://schemas.openxmlformats.org/drawingml/2006/main" xmlns:r="http://schemas.openxmlformats.org/officeDocument/2006/relationships" xmlns:p1510="http://schemas.microsoft.com/office/powerpoint/2015/10/main">
   <p1510:revLst>
-    <p1510:client id="{A688B22F-FD12-774C-9247-F3FA9836F7D0}" v="1" dt="2023-11-08T06:44:29.582"/>
+    <p1510:client id="{A688B22F-FD12-774C-9247-F3FA9836F7D0}" v="2" dt="2023-11-10T18:08:36.197"/>
   </p1510:revLst>
 </p1510:revInfo>
 </file>
@@ -134,18 +134,18 @@
   <pc:docChgLst>
     <pc:chgData name="Martin Lemaire" userId="66f74907ca5c5339" providerId="LiveId" clId="{A688B22F-FD12-774C-9247-F3FA9836F7D0}"/>
     <pc:docChg chg="modSld">
-      <pc:chgData name="Martin Lemaire" userId="66f74907ca5c5339" providerId="LiveId" clId="{A688B22F-FD12-774C-9247-F3FA9836F7D0}" dt="2023-11-08T06:44:58.588" v="21" actId="1076"/>
+      <pc:chgData name="Martin Lemaire" userId="66f74907ca5c5339" providerId="LiveId" clId="{A688B22F-FD12-774C-9247-F3FA9836F7D0}" dt="2023-11-10T18:09:10.940" v="46" actId="1076"/>
       <pc:docMkLst>
         <pc:docMk/>
       </pc:docMkLst>
       <pc:sldChg chg="addSp modSp mod">
-        <pc:chgData name="Martin Lemaire" userId="66f74907ca5c5339" providerId="LiveId" clId="{A688B22F-FD12-774C-9247-F3FA9836F7D0}" dt="2023-11-08T06:44:58.588" v="21" actId="1076"/>
+        <pc:chgData name="Martin Lemaire" userId="66f74907ca5c5339" providerId="LiveId" clId="{A688B22F-FD12-774C-9247-F3FA9836F7D0}" dt="2023-11-10T18:09:10.940" v="46" actId="1076"/>
         <pc:sldMkLst>
           <pc:docMk/>
           <pc:sldMk cId="3780971538" sldId="261"/>
         </pc:sldMkLst>
         <pc:spChg chg="add mod">
-          <ac:chgData name="Martin Lemaire" userId="66f74907ca5c5339" providerId="LiveId" clId="{A688B22F-FD12-774C-9247-F3FA9836F7D0}" dt="2023-11-08T06:44:58.588" v="21" actId="1076"/>
+          <ac:chgData name="Martin Lemaire" userId="66f74907ca5c5339" providerId="LiveId" clId="{A688B22F-FD12-774C-9247-F3FA9836F7D0}" dt="2023-11-10T18:09:10.940" v="46" actId="1076"/>
           <ac:spMkLst>
             <pc:docMk/>
             <pc:sldMk cId="3780971538" sldId="261"/>
@@ -153,7 +153,7 @@
           </ac:spMkLst>
         </pc:spChg>
         <pc:spChg chg="mod">
-          <ac:chgData name="Martin Lemaire" userId="66f74907ca5c5339" providerId="LiveId" clId="{A688B22F-FD12-774C-9247-F3FA9836F7D0}" dt="2023-11-08T06:44:58.588" v="21" actId="1076"/>
+          <ac:chgData name="Martin Lemaire" userId="66f74907ca5c5339" providerId="LiveId" clId="{A688B22F-FD12-774C-9247-F3FA9836F7D0}" dt="2023-11-10T18:09:10.940" v="46" actId="1076"/>
           <ac:spMkLst>
             <pc:docMk/>
             <pc:sldMk cId="3780971538" sldId="261"/>
@@ -161,7 +161,7 @@
           </ac:spMkLst>
         </pc:spChg>
         <pc:spChg chg="add mod">
-          <ac:chgData name="Martin Lemaire" userId="66f74907ca5c5339" providerId="LiveId" clId="{A688B22F-FD12-774C-9247-F3FA9836F7D0}" dt="2023-11-08T06:44:58.588" v="21" actId="1076"/>
+          <ac:chgData name="Martin Lemaire" userId="66f74907ca5c5339" providerId="LiveId" clId="{A688B22F-FD12-774C-9247-F3FA9836F7D0}" dt="2023-11-10T18:09:10.940" v="46" actId="1076"/>
           <ac:spMkLst>
             <pc:docMk/>
             <pc:sldMk cId="3780971538" sldId="261"/>
@@ -169,7 +169,7 @@
           </ac:spMkLst>
         </pc:spChg>
         <pc:spChg chg="mod">
-          <ac:chgData name="Martin Lemaire" userId="66f74907ca5c5339" providerId="LiveId" clId="{A688B22F-FD12-774C-9247-F3FA9836F7D0}" dt="2023-11-08T06:44:58.588" v="21" actId="1076"/>
+          <ac:chgData name="Martin Lemaire" userId="66f74907ca5c5339" providerId="LiveId" clId="{A688B22F-FD12-774C-9247-F3FA9836F7D0}" dt="2023-11-10T18:09:10.940" v="46" actId="1076"/>
           <ac:spMkLst>
             <pc:docMk/>
             <pc:sldMk cId="3780971538" sldId="261"/>
@@ -177,7 +177,7 @@
           </ac:spMkLst>
         </pc:spChg>
         <pc:spChg chg="mod">
-          <ac:chgData name="Martin Lemaire" userId="66f74907ca5c5339" providerId="LiveId" clId="{A688B22F-FD12-774C-9247-F3FA9836F7D0}" dt="2023-11-08T06:44:58.588" v="21" actId="1076"/>
+          <ac:chgData name="Martin Lemaire" userId="66f74907ca5c5339" providerId="LiveId" clId="{A688B22F-FD12-774C-9247-F3FA9836F7D0}" dt="2023-11-10T18:09:10.940" v="46" actId="1076"/>
           <ac:spMkLst>
             <pc:docMk/>
             <pc:sldMk cId="3780971538" sldId="261"/>
@@ -185,7 +185,7 @@
           </ac:spMkLst>
         </pc:spChg>
         <pc:spChg chg="mod">
-          <ac:chgData name="Martin Lemaire" userId="66f74907ca5c5339" providerId="LiveId" clId="{A688B22F-FD12-774C-9247-F3FA9836F7D0}" dt="2023-11-08T06:44:58.588" v="21" actId="1076"/>
+          <ac:chgData name="Martin Lemaire" userId="66f74907ca5c5339" providerId="LiveId" clId="{A688B22F-FD12-774C-9247-F3FA9836F7D0}" dt="2023-11-10T18:09:10.940" v="46" actId="1076"/>
           <ac:spMkLst>
             <pc:docMk/>
             <pc:sldMk cId="3780971538" sldId="261"/>
@@ -193,7 +193,7 @@
           </ac:spMkLst>
         </pc:spChg>
         <pc:spChg chg="mod">
-          <ac:chgData name="Martin Lemaire" userId="66f74907ca5c5339" providerId="LiveId" clId="{A688B22F-FD12-774C-9247-F3FA9836F7D0}" dt="2023-11-08T06:44:58.588" v="21" actId="1076"/>
+          <ac:chgData name="Martin Lemaire" userId="66f74907ca5c5339" providerId="LiveId" clId="{A688B22F-FD12-774C-9247-F3FA9836F7D0}" dt="2023-11-10T18:09:10.940" v="46" actId="1076"/>
           <ac:spMkLst>
             <pc:docMk/>
             <pc:sldMk cId="3780971538" sldId="261"/>
@@ -201,7 +201,7 @@
           </ac:spMkLst>
         </pc:spChg>
         <pc:spChg chg="mod">
-          <ac:chgData name="Martin Lemaire" userId="66f74907ca5c5339" providerId="LiveId" clId="{A688B22F-FD12-774C-9247-F3FA9836F7D0}" dt="2023-11-08T06:44:58.588" v="21" actId="1076"/>
+          <ac:chgData name="Martin Lemaire" userId="66f74907ca5c5339" providerId="LiveId" clId="{A688B22F-FD12-774C-9247-F3FA9836F7D0}" dt="2023-11-10T18:09:10.940" v="46" actId="1076"/>
           <ac:spMkLst>
             <pc:docMk/>
             <pc:sldMk cId="3780971538" sldId="261"/>
@@ -209,7 +209,7 @@
           </ac:spMkLst>
         </pc:spChg>
         <pc:spChg chg="mod">
-          <ac:chgData name="Martin Lemaire" userId="66f74907ca5c5339" providerId="LiveId" clId="{A688B22F-FD12-774C-9247-F3FA9836F7D0}" dt="2023-11-08T06:44:58.588" v="21" actId="1076"/>
+          <ac:chgData name="Martin Lemaire" userId="66f74907ca5c5339" providerId="LiveId" clId="{A688B22F-FD12-774C-9247-F3FA9836F7D0}" dt="2023-11-10T18:09:10.940" v="46" actId="1076"/>
           <ac:spMkLst>
             <pc:docMk/>
             <pc:sldMk cId="3780971538" sldId="261"/>
@@ -217,7 +217,7 @@
           </ac:spMkLst>
         </pc:spChg>
         <pc:spChg chg="mod">
-          <ac:chgData name="Martin Lemaire" userId="66f74907ca5c5339" providerId="LiveId" clId="{A688B22F-FD12-774C-9247-F3FA9836F7D0}" dt="2023-11-08T06:44:58.588" v="21" actId="1076"/>
+          <ac:chgData name="Martin Lemaire" userId="66f74907ca5c5339" providerId="LiveId" clId="{A688B22F-FD12-774C-9247-F3FA9836F7D0}" dt="2023-11-10T18:09:10.940" v="46" actId="1076"/>
           <ac:spMkLst>
             <pc:docMk/>
             <pc:sldMk cId="3780971538" sldId="261"/>
@@ -225,7 +225,7 @@
           </ac:spMkLst>
         </pc:spChg>
         <pc:spChg chg="mod">
-          <ac:chgData name="Martin Lemaire" userId="66f74907ca5c5339" providerId="LiveId" clId="{A688B22F-FD12-774C-9247-F3FA9836F7D0}" dt="2023-11-08T06:44:58.588" v="21" actId="1076"/>
+          <ac:chgData name="Martin Lemaire" userId="66f74907ca5c5339" providerId="LiveId" clId="{A688B22F-FD12-774C-9247-F3FA9836F7D0}" dt="2023-11-10T18:09:10.940" v="46" actId="1076"/>
           <ac:spMkLst>
             <pc:docMk/>
             <pc:sldMk cId="3780971538" sldId="261"/>
@@ -233,7 +233,7 @@
           </ac:spMkLst>
         </pc:spChg>
         <pc:spChg chg="mod">
-          <ac:chgData name="Martin Lemaire" userId="66f74907ca5c5339" providerId="LiveId" clId="{A688B22F-FD12-774C-9247-F3FA9836F7D0}" dt="2023-11-08T06:44:58.588" v="21" actId="1076"/>
+          <ac:chgData name="Martin Lemaire" userId="66f74907ca5c5339" providerId="LiveId" clId="{A688B22F-FD12-774C-9247-F3FA9836F7D0}" dt="2023-11-10T18:09:10.940" v="46" actId="1076"/>
           <ac:spMkLst>
             <pc:docMk/>
             <pc:sldMk cId="3780971538" sldId="261"/>
@@ -241,15 +241,31 @@
           </ac:spMkLst>
         </pc:spChg>
         <pc:spChg chg="mod">
-          <ac:chgData name="Martin Lemaire" userId="66f74907ca5c5339" providerId="LiveId" clId="{A688B22F-FD12-774C-9247-F3FA9836F7D0}" dt="2023-11-08T06:44:58.588" v="21" actId="1076"/>
+          <ac:chgData name="Martin Lemaire" userId="66f74907ca5c5339" providerId="LiveId" clId="{A688B22F-FD12-774C-9247-F3FA9836F7D0}" dt="2023-11-10T18:09:10.940" v="46" actId="1076"/>
           <ac:spMkLst>
             <pc:docMk/>
             <pc:sldMk cId="3780971538" sldId="261"/>
             <ac:spMk id="16" creationId="{CFEBDE09-A221-F2C1-C03F-FCC4E79A813E}"/>
           </ac:spMkLst>
         </pc:spChg>
+        <pc:spChg chg="add mod">
+          <ac:chgData name="Martin Lemaire" userId="66f74907ca5c5339" providerId="LiveId" clId="{A688B22F-FD12-774C-9247-F3FA9836F7D0}" dt="2023-11-10T18:09:10.940" v="46" actId="1076"/>
+          <ac:spMkLst>
+            <pc:docMk/>
+            <pc:sldMk cId="3780971538" sldId="261"/>
+            <ac:spMk id="17" creationId="{70DCF60A-7CB7-E01E-EF4F-1CBECA2A6769}"/>
+          </ac:spMkLst>
+        </pc:spChg>
+        <pc:spChg chg="add mod">
+          <ac:chgData name="Martin Lemaire" userId="66f74907ca5c5339" providerId="LiveId" clId="{A688B22F-FD12-774C-9247-F3FA9836F7D0}" dt="2023-11-10T18:09:10.940" v="46" actId="1076"/>
+          <ac:spMkLst>
+            <pc:docMk/>
+            <pc:sldMk cId="3780971538" sldId="261"/>
+            <ac:spMk id="19" creationId="{5061B1AA-9770-7FAC-17D6-92FCAEAABA71}"/>
+          </ac:spMkLst>
+        </pc:spChg>
         <pc:spChg chg="mod">
-          <ac:chgData name="Martin Lemaire" userId="66f74907ca5c5339" providerId="LiveId" clId="{A688B22F-FD12-774C-9247-F3FA9836F7D0}" dt="2023-11-08T06:44:58.588" v="21" actId="1076"/>
+          <ac:chgData name="Martin Lemaire" userId="66f74907ca5c5339" providerId="LiveId" clId="{A688B22F-FD12-774C-9247-F3FA9836F7D0}" dt="2023-11-10T18:09:10.940" v="46" actId="1076"/>
           <ac:spMkLst>
             <pc:docMk/>
             <pc:sldMk cId="3780971538" sldId="261"/>
@@ -257,7 +273,7 @@
           </ac:spMkLst>
         </pc:spChg>
         <pc:spChg chg="mod">
-          <ac:chgData name="Martin Lemaire" userId="66f74907ca5c5339" providerId="LiveId" clId="{A688B22F-FD12-774C-9247-F3FA9836F7D0}" dt="2023-11-08T06:44:58.588" v="21" actId="1076"/>
+          <ac:chgData name="Martin Lemaire" userId="66f74907ca5c5339" providerId="LiveId" clId="{A688B22F-FD12-774C-9247-F3FA9836F7D0}" dt="2023-11-10T18:09:10.940" v="46" actId="1076"/>
           <ac:spMkLst>
             <pc:docMk/>
             <pc:sldMk cId="3780971538" sldId="261"/>
@@ -265,7 +281,7 @@
           </ac:spMkLst>
         </pc:spChg>
         <pc:spChg chg="mod">
-          <ac:chgData name="Martin Lemaire" userId="66f74907ca5c5339" providerId="LiveId" clId="{A688B22F-FD12-774C-9247-F3FA9836F7D0}" dt="2023-11-08T06:44:58.588" v="21" actId="1076"/>
+          <ac:chgData name="Martin Lemaire" userId="66f74907ca5c5339" providerId="LiveId" clId="{A688B22F-FD12-774C-9247-F3FA9836F7D0}" dt="2023-11-10T18:09:10.940" v="46" actId="1076"/>
           <ac:spMkLst>
             <pc:docMk/>
             <pc:sldMk cId="3780971538" sldId="261"/>
@@ -273,7 +289,7 @@
           </ac:spMkLst>
         </pc:spChg>
         <pc:spChg chg="mod">
-          <ac:chgData name="Martin Lemaire" userId="66f74907ca5c5339" providerId="LiveId" clId="{A688B22F-FD12-774C-9247-F3FA9836F7D0}" dt="2023-11-08T06:44:58.588" v="21" actId="1076"/>
+          <ac:chgData name="Martin Lemaire" userId="66f74907ca5c5339" providerId="LiveId" clId="{A688B22F-FD12-774C-9247-F3FA9836F7D0}" dt="2023-11-10T18:09:10.940" v="46" actId="1076"/>
           <ac:spMkLst>
             <pc:docMk/>
             <pc:sldMk cId="3780971538" sldId="261"/>
@@ -281,7 +297,7 @@
           </ac:spMkLst>
         </pc:spChg>
         <pc:spChg chg="mod">
-          <ac:chgData name="Martin Lemaire" userId="66f74907ca5c5339" providerId="LiveId" clId="{A688B22F-FD12-774C-9247-F3FA9836F7D0}" dt="2023-11-08T06:44:58.588" v="21" actId="1076"/>
+          <ac:chgData name="Martin Lemaire" userId="66f74907ca5c5339" providerId="LiveId" clId="{A688B22F-FD12-774C-9247-F3FA9836F7D0}" dt="2023-11-10T18:09:10.940" v="46" actId="1076"/>
           <ac:spMkLst>
             <pc:docMk/>
             <pc:sldMk cId="3780971538" sldId="261"/>
@@ -289,7 +305,7 @@
           </ac:spMkLst>
         </pc:spChg>
         <pc:spChg chg="mod">
-          <ac:chgData name="Martin Lemaire" userId="66f74907ca5c5339" providerId="LiveId" clId="{A688B22F-FD12-774C-9247-F3FA9836F7D0}" dt="2023-11-08T06:44:58.588" v="21" actId="1076"/>
+          <ac:chgData name="Martin Lemaire" userId="66f74907ca5c5339" providerId="LiveId" clId="{A688B22F-FD12-774C-9247-F3FA9836F7D0}" dt="2023-11-10T18:09:10.940" v="46" actId="1076"/>
           <ac:spMkLst>
             <pc:docMk/>
             <pc:sldMk cId="3780971538" sldId="261"/>
@@ -297,7 +313,7 @@
           </ac:spMkLst>
         </pc:spChg>
         <pc:spChg chg="mod">
-          <ac:chgData name="Martin Lemaire" userId="66f74907ca5c5339" providerId="LiveId" clId="{A688B22F-FD12-774C-9247-F3FA9836F7D0}" dt="2023-11-08T06:44:58.588" v="21" actId="1076"/>
+          <ac:chgData name="Martin Lemaire" userId="66f74907ca5c5339" providerId="LiveId" clId="{A688B22F-FD12-774C-9247-F3FA9836F7D0}" dt="2023-11-10T18:09:10.940" v="46" actId="1076"/>
           <ac:spMkLst>
             <pc:docMk/>
             <pc:sldMk cId="3780971538" sldId="261"/>
@@ -305,7 +321,7 @@
           </ac:spMkLst>
         </pc:spChg>
         <pc:spChg chg="mod">
-          <ac:chgData name="Martin Lemaire" userId="66f74907ca5c5339" providerId="LiveId" clId="{A688B22F-FD12-774C-9247-F3FA9836F7D0}" dt="2023-11-08T06:44:58.588" v="21" actId="1076"/>
+          <ac:chgData name="Martin Lemaire" userId="66f74907ca5c5339" providerId="LiveId" clId="{A688B22F-FD12-774C-9247-F3FA9836F7D0}" dt="2023-11-10T18:09:10.940" v="46" actId="1076"/>
           <ac:spMkLst>
             <pc:docMk/>
             <pc:sldMk cId="3780971538" sldId="261"/>
@@ -313,7 +329,7 @@
           </ac:spMkLst>
         </pc:spChg>
         <pc:spChg chg="mod">
-          <ac:chgData name="Martin Lemaire" userId="66f74907ca5c5339" providerId="LiveId" clId="{A688B22F-FD12-774C-9247-F3FA9836F7D0}" dt="2023-11-08T06:44:58.588" v="21" actId="1076"/>
+          <ac:chgData name="Martin Lemaire" userId="66f74907ca5c5339" providerId="LiveId" clId="{A688B22F-FD12-774C-9247-F3FA9836F7D0}" dt="2023-11-10T18:09:10.940" v="46" actId="1076"/>
           <ac:spMkLst>
             <pc:docMk/>
             <pc:sldMk cId="3780971538" sldId="261"/>
@@ -321,7 +337,7 @@
           </ac:spMkLst>
         </pc:spChg>
         <pc:spChg chg="mod">
-          <ac:chgData name="Martin Lemaire" userId="66f74907ca5c5339" providerId="LiveId" clId="{A688B22F-FD12-774C-9247-F3FA9836F7D0}" dt="2023-11-08T06:44:58.588" v="21" actId="1076"/>
+          <ac:chgData name="Martin Lemaire" userId="66f74907ca5c5339" providerId="LiveId" clId="{A688B22F-FD12-774C-9247-F3FA9836F7D0}" dt="2023-11-10T18:09:10.940" v="46" actId="1076"/>
           <ac:spMkLst>
             <pc:docMk/>
             <pc:sldMk cId="3780971538" sldId="261"/>
@@ -329,7 +345,7 @@
           </ac:spMkLst>
         </pc:spChg>
         <pc:spChg chg="mod">
-          <ac:chgData name="Martin Lemaire" userId="66f74907ca5c5339" providerId="LiveId" clId="{A688B22F-FD12-774C-9247-F3FA9836F7D0}" dt="2023-11-08T06:44:58.588" v="21" actId="1076"/>
+          <ac:chgData name="Martin Lemaire" userId="66f74907ca5c5339" providerId="LiveId" clId="{A688B22F-FD12-774C-9247-F3FA9836F7D0}" dt="2023-11-10T18:09:10.940" v="46" actId="1076"/>
           <ac:spMkLst>
             <pc:docMk/>
             <pc:sldMk cId="3780971538" sldId="261"/>
@@ -337,7 +353,7 @@
           </ac:spMkLst>
         </pc:spChg>
         <pc:spChg chg="mod">
-          <ac:chgData name="Martin Lemaire" userId="66f74907ca5c5339" providerId="LiveId" clId="{A688B22F-FD12-774C-9247-F3FA9836F7D0}" dt="2023-11-08T06:44:58.588" v="21" actId="1076"/>
+          <ac:chgData name="Martin Lemaire" userId="66f74907ca5c5339" providerId="LiveId" clId="{A688B22F-FD12-774C-9247-F3FA9836F7D0}" dt="2023-11-10T18:09:10.940" v="46" actId="1076"/>
           <ac:spMkLst>
             <pc:docMk/>
             <pc:sldMk cId="3780971538" sldId="261"/>
@@ -345,7 +361,7 @@
           </ac:spMkLst>
         </pc:spChg>
         <pc:spChg chg="mod">
-          <ac:chgData name="Martin Lemaire" userId="66f74907ca5c5339" providerId="LiveId" clId="{A688B22F-FD12-774C-9247-F3FA9836F7D0}" dt="2023-11-08T06:44:58.588" v="21" actId="1076"/>
+          <ac:chgData name="Martin Lemaire" userId="66f74907ca5c5339" providerId="LiveId" clId="{A688B22F-FD12-774C-9247-F3FA9836F7D0}" dt="2023-11-10T18:09:10.940" v="46" actId="1076"/>
           <ac:spMkLst>
             <pc:docMk/>
             <pc:sldMk cId="3780971538" sldId="261"/>
@@ -353,7 +369,7 @@
           </ac:spMkLst>
         </pc:spChg>
         <pc:spChg chg="mod">
-          <ac:chgData name="Martin Lemaire" userId="66f74907ca5c5339" providerId="LiveId" clId="{A688B22F-FD12-774C-9247-F3FA9836F7D0}" dt="2023-11-08T06:44:58.588" v="21" actId="1076"/>
+          <ac:chgData name="Martin Lemaire" userId="66f74907ca5c5339" providerId="LiveId" clId="{A688B22F-FD12-774C-9247-F3FA9836F7D0}" dt="2023-11-10T18:09:10.940" v="46" actId="1076"/>
           <ac:spMkLst>
             <pc:docMk/>
             <pc:sldMk cId="3780971538" sldId="261"/>
@@ -361,7 +377,7 @@
           </ac:spMkLst>
         </pc:spChg>
         <pc:spChg chg="mod">
-          <ac:chgData name="Martin Lemaire" userId="66f74907ca5c5339" providerId="LiveId" clId="{A688B22F-FD12-774C-9247-F3FA9836F7D0}" dt="2023-11-08T06:44:58.588" v="21" actId="1076"/>
+          <ac:chgData name="Martin Lemaire" userId="66f74907ca5c5339" providerId="LiveId" clId="{A688B22F-FD12-774C-9247-F3FA9836F7D0}" dt="2023-11-10T18:09:10.940" v="46" actId="1076"/>
           <ac:spMkLst>
             <pc:docMk/>
             <pc:sldMk cId="3780971538" sldId="261"/>
@@ -369,7 +385,7 @@
           </ac:spMkLst>
         </pc:spChg>
         <pc:spChg chg="mod">
-          <ac:chgData name="Martin Lemaire" userId="66f74907ca5c5339" providerId="LiveId" clId="{A688B22F-FD12-774C-9247-F3FA9836F7D0}" dt="2023-11-08T06:44:58.588" v="21" actId="1076"/>
+          <ac:chgData name="Martin Lemaire" userId="66f74907ca5c5339" providerId="LiveId" clId="{A688B22F-FD12-774C-9247-F3FA9836F7D0}" dt="2023-11-10T18:09:10.940" v="46" actId="1076"/>
           <ac:spMkLst>
             <pc:docMk/>
             <pc:sldMk cId="3780971538" sldId="261"/>
@@ -377,7 +393,7 @@
           </ac:spMkLst>
         </pc:spChg>
         <pc:spChg chg="mod">
-          <ac:chgData name="Martin Lemaire" userId="66f74907ca5c5339" providerId="LiveId" clId="{A688B22F-FD12-774C-9247-F3FA9836F7D0}" dt="2023-11-08T06:44:58.588" v="21" actId="1076"/>
+          <ac:chgData name="Martin Lemaire" userId="66f74907ca5c5339" providerId="LiveId" clId="{A688B22F-FD12-774C-9247-F3FA9836F7D0}" dt="2023-11-10T18:09:10.940" v="46" actId="1076"/>
           <ac:spMkLst>
             <pc:docMk/>
             <pc:sldMk cId="3780971538" sldId="261"/>
@@ -385,7 +401,7 @@
           </ac:spMkLst>
         </pc:spChg>
         <pc:spChg chg="mod">
-          <ac:chgData name="Martin Lemaire" userId="66f74907ca5c5339" providerId="LiveId" clId="{A688B22F-FD12-774C-9247-F3FA9836F7D0}" dt="2023-11-08T06:44:58.588" v="21" actId="1076"/>
+          <ac:chgData name="Martin Lemaire" userId="66f74907ca5c5339" providerId="LiveId" clId="{A688B22F-FD12-774C-9247-F3FA9836F7D0}" dt="2023-11-10T18:09:10.940" v="46" actId="1076"/>
           <ac:spMkLst>
             <pc:docMk/>
             <pc:sldMk cId="3780971538" sldId="261"/>
@@ -393,7 +409,7 @@
           </ac:spMkLst>
         </pc:spChg>
         <pc:spChg chg="mod">
-          <ac:chgData name="Martin Lemaire" userId="66f74907ca5c5339" providerId="LiveId" clId="{A688B22F-FD12-774C-9247-F3FA9836F7D0}" dt="2023-11-08T06:44:58.588" v="21" actId="1076"/>
+          <ac:chgData name="Martin Lemaire" userId="66f74907ca5c5339" providerId="LiveId" clId="{A688B22F-FD12-774C-9247-F3FA9836F7D0}" dt="2023-11-10T18:09:10.940" v="46" actId="1076"/>
           <ac:spMkLst>
             <pc:docMk/>
             <pc:sldMk cId="3780971538" sldId="261"/>
@@ -401,15 +417,23 @@
           </ac:spMkLst>
         </pc:spChg>
         <pc:cxnChg chg="add mod">
-          <ac:chgData name="Martin Lemaire" userId="66f74907ca5c5339" providerId="LiveId" clId="{A688B22F-FD12-774C-9247-F3FA9836F7D0}" dt="2023-11-08T06:44:58.588" v="21" actId="1076"/>
+          <ac:chgData name="Martin Lemaire" userId="66f74907ca5c5339" providerId="LiveId" clId="{A688B22F-FD12-774C-9247-F3FA9836F7D0}" dt="2023-11-10T18:09:10.940" v="46" actId="1076"/>
           <ac:cxnSpMkLst>
             <pc:docMk/>
             <pc:sldMk cId="3780971538" sldId="261"/>
             <ac:cxnSpMk id="5" creationId="{06DFE8C9-42FE-4CDB-F0DF-E5B51822A5A0}"/>
           </ac:cxnSpMkLst>
         </pc:cxnChg>
+        <pc:cxnChg chg="add mod">
+          <ac:chgData name="Martin Lemaire" userId="66f74907ca5c5339" providerId="LiveId" clId="{A688B22F-FD12-774C-9247-F3FA9836F7D0}" dt="2023-11-10T18:09:10.940" v="46" actId="1076"/>
+          <ac:cxnSpMkLst>
+            <pc:docMk/>
+            <pc:sldMk cId="3780971538" sldId="261"/>
+            <ac:cxnSpMk id="18" creationId="{27060DE7-4582-9124-3AFC-FAC0194A14DE}"/>
+          </ac:cxnSpMkLst>
+        </pc:cxnChg>
         <pc:cxnChg chg="mod">
-          <ac:chgData name="Martin Lemaire" userId="66f74907ca5c5339" providerId="LiveId" clId="{A688B22F-FD12-774C-9247-F3FA9836F7D0}" dt="2023-11-08T06:44:58.588" v="21" actId="1076"/>
+          <ac:chgData name="Martin Lemaire" userId="66f74907ca5c5339" providerId="LiveId" clId="{A688B22F-FD12-774C-9247-F3FA9836F7D0}" dt="2023-11-10T18:09:10.940" v="46" actId="1076"/>
           <ac:cxnSpMkLst>
             <pc:docMk/>
             <pc:sldMk cId="3780971538" sldId="261"/>
@@ -417,7 +441,7 @@
           </ac:cxnSpMkLst>
         </pc:cxnChg>
         <pc:cxnChg chg="mod">
-          <ac:chgData name="Martin Lemaire" userId="66f74907ca5c5339" providerId="LiveId" clId="{A688B22F-FD12-774C-9247-F3FA9836F7D0}" dt="2023-11-08T06:44:58.588" v="21" actId="1076"/>
+          <ac:chgData name="Martin Lemaire" userId="66f74907ca5c5339" providerId="LiveId" clId="{A688B22F-FD12-774C-9247-F3FA9836F7D0}" dt="2023-11-10T18:09:10.940" v="46" actId="1076"/>
           <ac:cxnSpMkLst>
             <pc:docMk/>
             <pc:sldMk cId="3780971538" sldId="261"/>
@@ -425,7 +449,7 @@
           </ac:cxnSpMkLst>
         </pc:cxnChg>
         <pc:cxnChg chg="mod">
-          <ac:chgData name="Martin Lemaire" userId="66f74907ca5c5339" providerId="LiveId" clId="{A688B22F-FD12-774C-9247-F3FA9836F7D0}" dt="2023-11-08T06:44:58.588" v="21" actId="1076"/>
+          <ac:chgData name="Martin Lemaire" userId="66f74907ca5c5339" providerId="LiveId" clId="{A688B22F-FD12-774C-9247-F3FA9836F7D0}" dt="2023-11-10T18:09:10.940" v="46" actId="1076"/>
           <ac:cxnSpMkLst>
             <pc:docMk/>
             <pc:sldMk cId="3780971538" sldId="261"/>
@@ -433,7 +457,7 @@
           </ac:cxnSpMkLst>
         </pc:cxnChg>
         <pc:cxnChg chg="mod">
-          <ac:chgData name="Martin Lemaire" userId="66f74907ca5c5339" providerId="LiveId" clId="{A688B22F-FD12-774C-9247-F3FA9836F7D0}" dt="2023-11-08T06:44:58.588" v="21" actId="1076"/>
+          <ac:chgData name="Martin Lemaire" userId="66f74907ca5c5339" providerId="LiveId" clId="{A688B22F-FD12-774C-9247-F3FA9836F7D0}" dt="2023-11-10T18:09:10.940" v="46" actId="1076"/>
           <ac:cxnSpMkLst>
             <pc:docMk/>
             <pc:sldMk cId="3780971538" sldId="261"/>
@@ -441,7 +465,7 @@
           </ac:cxnSpMkLst>
         </pc:cxnChg>
         <pc:cxnChg chg="mod">
-          <ac:chgData name="Martin Lemaire" userId="66f74907ca5c5339" providerId="LiveId" clId="{A688B22F-FD12-774C-9247-F3FA9836F7D0}" dt="2023-11-08T06:44:58.588" v="21" actId="1076"/>
+          <ac:chgData name="Martin Lemaire" userId="66f74907ca5c5339" providerId="LiveId" clId="{A688B22F-FD12-774C-9247-F3FA9836F7D0}" dt="2023-11-10T18:09:10.940" v="46" actId="1076"/>
           <ac:cxnSpMkLst>
             <pc:docMk/>
             <pc:sldMk cId="3780971538" sldId="261"/>
@@ -449,7 +473,7 @@
           </ac:cxnSpMkLst>
         </pc:cxnChg>
         <pc:cxnChg chg="mod">
-          <ac:chgData name="Martin Lemaire" userId="66f74907ca5c5339" providerId="LiveId" clId="{A688B22F-FD12-774C-9247-F3FA9836F7D0}" dt="2023-11-08T06:44:58.588" v="21" actId="1076"/>
+          <ac:chgData name="Martin Lemaire" userId="66f74907ca5c5339" providerId="LiveId" clId="{A688B22F-FD12-774C-9247-F3FA9836F7D0}" dt="2023-11-10T18:09:10.940" v="46" actId="1076"/>
           <ac:cxnSpMkLst>
             <pc:docMk/>
             <pc:sldMk cId="3780971538" sldId="261"/>
@@ -457,7 +481,7 @@
           </ac:cxnSpMkLst>
         </pc:cxnChg>
         <pc:cxnChg chg="mod">
-          <ac:chgData name="Martin Lemaire" userId="66f74907ca5c5339" providerId="LiveId" clId="{A688B22F-FD12-774C-9247-F3FA9836F7D0}" dt="2023-11-08T06:44:58.588" v="21" actId="1076"/>
+          <ac:chgData name="Martin Lemaire" userId="66f74907ca5c5339" providerId="LiveId" clId="{A688B22F-FD12-774C-9247-F3FA9836F7D0}" dt="2023-11-10T18:09:10.940" v="46" actId="1076"/>
           <ac:cxnSpMkLst>
             <pc:docMk/>
             <pc:sldMk cId="3780971538" sldId="261"/>
@@ -465,7 +489,7 @@
           </ac:cxnSpMkLst>
         </pc:cxnChg>
         <pc:cxnChg chg="mod">
-          <ac:chgData name="Martin Lemaire" userId="66f74907ca5c5339" providerId="LiveId" clId="{A688B22F-FD12-774C-9247-F3FA9836F7D0}" dt="2023-11-08T06:44:58.588" v="21" actId="1076"/>
+          <ac:chgData name="Martin Lemaire" userId="66f74907ca5c5339" providerId="LiveId" clId="{A688B22F-FD12-774C-9247-F3FA9836F7D0}" dt="2023-11-10T18:09:10.940" v="46" actId="1076"/>
           <ac:cxnSpMkLst>
             <pc:docMk/>
             <pc:sldMk cId="3780971538" sldId="261"/>
@@ -473,7 +497,7 @@
           </ac:cxnSpMkLst>
         </pc:cxnChg>
         <pc:cxnChg chg="mod">
-          <ac:chgData name="Martin Lemaire" userId="66f74907ca5c5339" providerId="LiveId" clId="{A688B22F-FD12-774C-9247-F3FA9836F7D0}" dt="2023-11-08T06:44:58.588" v="21" actId="1076"/>
+          <ac:chgData name="Martin Lemaire" userId="66f74907ca5c5339" providerId="LiveId" clId="{A688B22F-FD12-774C-9247-F3FA9836F7D0}" dt="2023-11-10T18:09:10.940" v="46" actId="1076"/>
           <ac:cxnSpMkLst>
             <pc:docMk/>
             <pc:sldMk cId="3780971538" sldId="261"/>
@@ -481,7 +505,7 @@
           </ac:cxnSpMkLst>
         </pc:cxnChg>
         <pc:cxnChg chg="mod">
-          <ac:chgData name="Martin Lemaire" userId="66f74907ca5c5339" providerId="LiveId" clId="{A688B22F-FD12-774C-9247-F3FA9836F7D0}" dt="2023-11-08T06:44:58.588" v="21" actId="1076"/>
+          <ac:chgData name="Martin Lemaire" userId="66f74907ca5c5339" providerId="LiveId" clId="{A688B22F-FD12-774C-9247-F3FA9836F7D0}" dt="2023-11-10T18:09:10.940" v="46" actId="1076"/>
           <ac:cxnSpMkLst>
             <pc:docMk/>
             <pc:sldMk cId="3780971538" sldId="261"/>
@@ -489,7 +513,7 @@
           </ac:cxnSpMkLst>
         </pc:cxnChg>
         <pc:cxnChg chg="mod">
-          <ac:chgData name="Martin Lemaire" userId="66f74907ca5c5339" providerId="LiveId" clId="{A688B22F-FD12-774C-9247-F3FA9836F7D0}" dt="2023-11-08T06:44:58.588" v="21" actId="1076"/>
+          <ac:chgData name="Martin Lemaire" userId="66f74907ca5c5339" providerId="LiveId" clId="{A688B22F-FD12-774C-9247-F3FA9836F7D0}" dt="2023-11-10T18:09:10.940" v="46" actId="1076"/>
           <ac:cxnSpMkLst>
             <pc:docMk/>
             <pc:sldMk cId="3780971538" sldId="261"/>
@@ -497,7 +521,7 @@
           </ac:cxnSpMkLst>
         </pc:cxnChg>
         <pc:cxnChg chg="mod">
-          <ac:chgData name="Martin Lemaire" userId="66f74907ca5c5339" providerId="LiveId" clId="{A688B22F-FD12-774C-9247-F3FA9836F7D0}" dt="2023-11-08T06:44:58.588" v="21" actId="1076"/>
+          <ac:chgData name="Martin Lemaire" userId="66f74907ca5c5339" providerId="LiveId" clId="{A688B22F-FD12-774C-9247-F3FA9836F7D0}" dt="2023-11-10T18:09:10.940" v="46" actId="1076"/>
           <ac:cxnSpMkLst>
             <pc:docMk/>
             <pc:sldMk cId="3780971538" sldId="261"/>
@@ -505,7 +529,7 @@
           </ac:cxnSpMkLst>
         </pc:cxnChg>
         <pc:cxnChg chg="mod">
-          <ac:chgData name="Martin Lemaire" userId="66f74907ca5c5339" providerId="LiveId" clId="{A688B22F-FD12-774C-9247-F3FA9836F7D0}" dt="2023-11-08T06:44:58.588" v="21" actId="1076"/>
+          <ac:chgData name="Martin Lemaire" userId="66f74907ca5c5339" providerId="LiveId" clId="{A688B22F-FD12-774C-9247-F3FA9836F7D0}" dt="2023-11-10T18:09:10.940" v="46" actId="1076"/>
           <ac:cxnSpMkLst>
             <pc:docMk/>
             <pc:sldMk cId="3780971538" sldId="261"/>
@@ -513,7 +537,7 @@
           </ac:cxnSpMkLst>
         </pc:cxnChg>
         <pc:cxnChg chg="mod">
-          <ac:chgData name="Martin Lemaire" userId="66f74907ca5c5339" providerId="LiveId" clId="{A688B22F-FD12-774C-9247-F3FA9836F7D0}" dt="2023-11-08T06:44:58.588" v="21" actId="1076"/>
+          <ac:chgData name="Martin Lemaire" userId="66f74907ca5c5339" providerId="LiveId" clId="{A688B22F-FD12-774C-9247-F3FA9836F7D0}" dt="2023-11-10T18:09:10.940" v="46" actId="1076"/>
           <ac:cxnSpMkLst>
             <pc:docMk/>
             <pc:sldMk cId="3780971538" sldId="261"/>
@@ -521,7 +545,7 @@
           </ac:cxnSpMkLst>
         </pc:cxnChg>
         <pc:cxnChg chg="mod">
-          <ac:chgData name="Martin Lemaire" userId="66f74907ca5c5339" providerId="LiveId" clId="{A688B22F-FD12-774C-9247-F3FA9836F7D0}" dt="2023-11-08T06:44:58.588" v="21" actId="1076"/>
+          <ac:chgData name="Martin Lemaire" userId="66f74907ca5c5339" providerId="LiveId" clId="{A688B22F-FD12-774C-9247-F3FA9836F7D0}" dt="2023-11-10T18:09:10.940" v="46" actId="1076"/>
           <ac:cxnSpMkLst>
             <pc:docMk/>
             <pc:sldMk cId="3780971538" sldId="261"/>
@@ -665,7 +689,7 @@
           <a:p>
             <a:fld id="{C9F3CE57-0FCA-794F-9775-AD39B6E006B8}" type="datetimeFigureOut">
               <a:rPr lang="en-US" smtClean="0"/>
-              <a:t>11/8/23</a:t>
+              <a:t>11/10/23</a:t>
             </a:fld>
             <a:endParaRPr lang="en-US"/>
           </a:p>
@@ -835,7 +859,7 @@
           <a:p>
             <a:fld id="{C9F3CE57-0FCA-794F-9775-AD39B6E006B8}" type="datetimeFigureOut">
               <a:rPr lang="en-US" smtClean="0"/>
-              <a:t>11/8/23</a:t>
+              <a:t>11/10/23</a:t>
             </a:fld>
             <a:endParaRPr lang="en-US"/>
           </a:p>
@@ -1015,7 +1039,7 @@
           <a:p>
             <a:fld id="{C9F3CE57-0FCA-794F-9775-AD39B6E006B8}" type="datetimeFigureOut">
               <a:rPr lang="en-US" smtClean="0"/>
-              <a:t>11/8/23</a:t>
+              <a:t>11/10/23</a:t>
             </a:fld>
             <a:endParaRPr lang="en-US"/>
           </a:p>
@@ -1185,7 +1209,7 @@
           <a:p>
             <a:fld id="{C9F3CE57-0FCA-794F-9775-AD39B6E006B8}" type="datetimeFigureOut">
               <a:rPr lang="en-US" smtClean="0"/>
-              <a:t>11/8/23</a:t>
+              <a:t>11/10/23</a:t>
             </a:fld>
             <a:endParaRPr lang="en-US"/>
           </a:p>
@@ -1429,7 +1453,7 @@
           <a:p>
             <a:fld id="{C9F3CE57-0FCA-794F-9775-AD39B6E006B8}" type="datetimeFigureOut">
               <a:rPr lang="en-US" smtClean="0"/>
-              <a:t>11/8/23</a:t>
+              <a:t>11/10/23</a:t>
             </a:fld>
             <a:endParaRPr lang="en-US"/>
           </a:p>
@@ -1661,7 +1685,7 @@
           <a:p>
             <a:fld id="{C9F3CE57-0FCA-794F-9775-AD39B6E006B8}" type="datetimeFigureOut">
               <a:rPr lang="en-US" smtClean="0"/>
-              <a:t>11/8/23</a:t>
+              <a:t>11/10/23</a:t>
             </a:fld>
             <a:endParaRPr lang="en-US"/>
           </a:p>
@@ -2028,7 +2052,7 @@
           <a:p>
             <a:fld id="{C9F3CE57-0FCA-794F-9775-AD39B6E006B8}" type="datetimeFigureOut">
               <a:rPr lang="en-US" smtClean="0"/>
-              <a:t>11/8/23</a:t>
+              <a:t>11/10/23</a:t>
             </a:fld>
             <a:endParaRPr lang="en-US"/>
           </a:p>
@@ -2146,7 +2170,7 @@
           <a:p>
             <a:fld id="{C9F3CE57-0FCA-794F-9775-AD39B6E006B8}" type="datetimeFigureOut">
               <a:rPr lang="en-US" smtClean="0"/>
-              <a:t>11/8/23</a:t>
+              <a:t>11/10/23</a:t>
             </a:fld>
             <a:endParaRPr lang="en-US"/>
           </a:p>
@@ -2241,7 +2265,7 @@
           <a:p>
             <a:fld id="{C9F3CE57-0FCA-794F-9775-AD39B6E006B8}" type="datetimeFigureOut">
               <a:rPr lang="en-US" smtClean="0"/>
-              <a:t>11/8/23</a:t>
+              <a:t>11/10/23</a:t>
             </a:fld>
             <a:endParaRPr lang="en-US"/>
           </a:p>
@@ -2518,7 +2542,7 @@
           <a:p>
             <a:fld id="{C9F3CE57-0FCA-794F-9775-AD39B6E006B8}" type="datetimeFigureOut">
               <a:rPr lang="en-US" smtClean="0"/>
-              <a:t>11/8/23</a:t>
+              <a:t>11/10/23</a:t>
             </a:fld>
             <a:endParaRPr lang="en-US"/>
           </a:p>
@@ -2775,7 +2799,7 @@
           <a:p>
             <a:fld id="{C9F3CE57-0FCA-794F-9775-AD39B6E006B8}" type="datetimeFigureOut">
               <a:rPr lang="en-US" smtClean="0"/>
-              <a:t>11/8/23</a:t>
+              <a:t>11/10/23</a:t>
             </a:fld>
             <a:endParaRPr lang="en-US"/>
           </a:p>
@@ -2988,7 +3012,7 @@
           <a:p>
             <a:fld id="{C9F3CE57-0FCA-794F-9775-AD39B6E006B8}" type="datetimeFigureOut">
               <a:rPr lang="en-US" smtClean="0"/>
-              <a:t>11/8/23</a:t>
+              <a:t>11/10/23</a:t>
             </a:fld>
             <a:endParaRPr lang="en-US"/>
           </a:p>
@@ -5671,7 +5695,7 @@
         </p:nvSpPr>
         <p:spPr>
           <a:xfrm>
-            <a:off x="3635498" y="1212816"/>
+            <a:off x="3635498" y="1025247"/>
             <a:ext cx="1873004" cy="211625"/>
           </a:xfrm>
           <a:prstGeom prst="rect">
@@ -5730,7 +5754,7 @@
         </p:nvSpPr>
         <p:spPr>
           <a:xfrm>
-            <a:off x="3635498" y="1514285"/>
+            <a:off x="3635498" y="1326716"/>
             <a:ext cx="1873004" cy="211625"/>
           </a:xfrm>
           <a:prstGeom prst="rect">
@@ -5789,7 +5813,7 @@
         </p:nvSpPr>
         <p:spPr>
           <a:xfrm>
-            <a:off x="3635498" y="1815754"/>
+            <a:off x="3635498" y="1628185"/>
             <a:ext cx="1873004" cy="211625"/>
           </a:xfrm>
           <a:prstGeom prst="rect">
@@ -5848,7 +5872,7 @@
         </p:nvSpPr>
         <p:spPr>
           <a:xfrm>
-            <a:off x="3635498" y="2117223"/>
+            <a:off x="3635498" y="1929654"/>
             <a:ext cx="1873004" cy="211625"/>
           </a:xfrm>
           <a:prstGeom prst="rect">
@@ -5907,7 +5931,7 @@
         </p:nvSpPr>
         <p:spPr>
           <a:xfrm>
-            <a:off x="3635498" y="2418692"/>
+            <a:off x="3635498" y="2231123"/>
             <a:ext cx="1873004" cy="211625"/>
           </a:xfrm>
           <a:prstGeom prst="rect">
@@ -5966,7 +5990,7 @@
         </p:nvSpPr>
         <p:spPr>
           <a:xfrm>
-            <a:off x="3635498" y="3012769"/>
+            <a:off x="3635498" y="2825200"/>
             <a:ext cx="1873004" cy="211625"/>
           </a:xfrm>
           <a:prstGeom prst="rect">
@@ -6025,7 +6049,7 @@
         </p:nvSpPr>
         <p:spPr>
           <a:xfrm>
-            <a:off x="3635498" y="3314238"/>
+            <a:off x="3635498" y="3126669"/>
             <a:ext cx="1873004" cy="211625"/>
           </a:xfrm>
           <a:prstGeom prst="rect">
@@ -6084,7 +6108,7 @@
         </p:nvSpPr>
         <p:spPr>
           <a:xfrm>
-            <a:off x="3635498" y="3615707"/>
+            <a:off x="3635498" y="3428138"/>
             <a:ext cx="1873004" cy="211625"/>
           </a:xfrm>
           <a:prstGeom prst="rect">
@@ -6143,7 +6167,7 @@
         </p:nvSpPr>
         <p:spPr>
           <a:xfrm>
-            <a:off x="3635498" y="3917176"/>
+            <a:off x="3635498" y="3729607"/>
             <a:ext cx="1873004" cy="211625"/>
           </a:xfrm>
           <a:prstGeom prst="rect">
@@ -6202,7 +6226,7 @@
         </p:nvSpPr>
         <p:spPr>
           <a:xfrm>
-            <a:off x="3635498" y="4218645"/>
+            <a:off x="3635498" y="4031076"/>
             <a:ext cx="1873004" cy="211625"/>
           </a:xfrm>
           <a:prstGeom prst="rect">
@@ -6261,7 +6285,7 @@
         </p:nvSpPr>
         <p:spPr>
           <a:xfrm>
-            <a:off x="3635498" y="4520114"/>
+            <a:off x="3635498" y="4332545"/>
             <a:ext cx="1873004" cy="211625"/>
           </a:xfrm>
           <a:prstGeom prst="rect">
@@ -6320,7 +6344,7 @@
         </p:nvSpPr>
         <p:spPr>
           <a:xfrm>
-            <a:off x="3633216" y="2716456"/>
+            <a:off x="3633216" y="2528887"/>
             <a:ext cx="1873004" cy="211625"/>
           </a:xfrm>
           <a:prstGeom prst="rect">
@@ -6379,7 +6403,7 @@
         </p:nvSpPr>
         <p:spPr>
           <a:xfrm>
-            <a:off x="3633216" y="4821583"/>
+            <a:off x="3633216" y="4634014"/>
             <a:ext cx="1873004" cy="211625"/>
           </a:xfrm>
           <a:prstGeom prst="rect">
@@ -6438,7 +6462,7 @@
         </p:nvSpPr>
         <p:spPr>
           <a:xfrm>
-            <a:off x="3633216" y="5117896"/>
+            <a:off x="3633216" y="4930327"/>
             <a:ext cx="1873004" cy="211625"/>
           </a:xfrm>
           <a:prstGeom prst="rect">
@@ -6499,7 +6523,7 @@
         </p:nvCxnSpPr>
         <p:spPr>
           <a:xfrm flipV="1">
-            <a:off x="5508502" y="1318628"/>
+            <a:off x="5508502" y="1131059"/>
             <a:ext cx="243369" cy="1"/>
           </a:xfrm>
           <a:prstGeom prst="straightConnector1">
@@ -6541,7 +6565,7 @@
         </p:nvSpPr>
         <p:spPr>
           <a:xfrm>
-            <a:off x="5950995" y="1210776"/>
+            <a:off x="5950995" y="1023207"/>
             <a:ext cx="243369" cy="211572"/>
           </a:xfrm>
           <a:prstGeom prst="rect">
@@ -6600,7 +6624,7 @@
         </p:nvCxnSpPr>
         <p:spPr>
           <a:xfrm flipV="1">
-            <a:off x="5508502" y="1614888"/>
+            <a:off x="5508502" y="1427319"/>
             <a:ext cx="243369" cy="1"/>
           </a:xfrm>
           <a:prstGeom prst="straightConnector1">
@@ -6642,7 +6666,7 @@
         </p:nvSpPr>
         <p:spPr>
           <a:xfrm>
-            <a:off x="5950995" y="1507036"/>
+            <a:off x="5950995" y="1319467"/>
             <a:ext cx="243369" cy="211572"/>
           </a:xfrm>
           <a:prstGeom prst="rect">
@@ -6701,7 +6725,7 @@
         </p:nvCxnSpPr>
         <p:spPr>
           <a:xfrm flipV="1">
-            <a:off x="5508502" y="1937273"/>
+            <a:off x="5508502" y="1749704"/>
             <a:ext cx="243369" cy="1"/>
           </a:xfrm>
           <a:prstGeom prst="straightConnector1">
@@ -6743,7 +6767,7 @@
         </p:nvSpPr>
         <p:spPr>
           <a:xfrm>
-            <a:off x="5950995" y="1829421"/>
+            <a:off x="5950995" y="1641852"/>
             <a:ext cx="243369" cy="211572"/>
           </a:xfrm>
           <a:prstGeom prst="rect">
@@ -6802,7 +6826,7 @@
         </p:nvCxnSpPr>
         <p:spPr>
           <a:xfrm flipV="1">
-            <a:off x="5508502" y="2220886"/>
+            <a:off x="5508502" y="2033317"/>
             <a:ext cx="243369" cy="1"/>
           </a:xfrm>
           <a:prstGeom prst="straightConnector1">
@@ -6844,7 +6868,7 @@
         </p:nvSpPr>
         <p:spPr>
           <a:xfrm>
-            <a:off x="5950995" y="2113034"/>
+            <a:off x="5950995" y="1925465"/>
             <a:ext cx="243369" cy="211572"/>
           </a:xfrm>
           <a:prstGeom prst="rect">
@@ -6903,7 +6927,7 @@
         </p:nvCxnSpPr>
         <p:spPr>
           <a:xfrm flipV="1">
-            <a:off x="5506220" y="2515283"/>
+            <a:off x="5506220" y="2327714"/>
             <a:ext cx="243369" cy="1"/>
           </a:xfrm>
           <a:prstGeom prst="straightConnector1">
@@ -6945,7 +6969,7 @@
         </p:nvSpPr>
         <p:spPr>
           <a:xfrm>
-            <a:off x="5948713" y="2407431"/>
+            <a:off x="5948713" y="2219862"/>
             <a:ext cx="243369" cy="211572"/>
           </a:xfrm>
           <a:prstGeom prst="rect">
@@ -7004,7 +7028,7 @@
         </p:nvCxnSpPr>
         <p:spPr>
           <a:xfrm flipV="1">
-            <a:off x="5506220" y="2818113"/>
+            <a:off x="5506220" y="2630544"/>
             <a:ext cx="243369" cy="1"/>
           </a:xfrm>
           <a:prstGeom prst="straightConnector1">
@@ -7046,7 +7070,7 @@
         </p:nvSpPr>
         <p:spPr>
           <a:xfrm>
-            <a:off x="5948713" y="2710261"/>
+            <a:off x="5948713" y="2522692"/>
             <a:ext cx="243369" cy="211572"/>
           </a:xfrm>
           <a:prstGeom prst="rect">
@@ -7105,7 +7129,7 @@
         </p:nvCxnSpPr>
         <p:spPr>
           <a:xfrm flipV="1">
-            <a:off x="5506220" y="3120314"/>
+            <a:off x="5506220" y="2932745"/>
             <a:ext cx="243369" cy="1"/>
           </a:xfrm>
           <a:prstGeom prst="straightConnector1">
@@ -7147,7 +7171,7 @@
         </p:nvSpPr>
         <p:spPr>
           <a:xfrm>
-            <a:off x="5948713" y="3012462"/>
+            <a:off x="5948713" y="2824893"/>
             <a:ext cx="243369" cy="211572"/>
           </a:xfrm>
           <a:prstGeom prst="rect">
@@ -7206,7 +7230,7 @@
         </p:nvCxnSpPr>
         <p:spPr>
           <a:xfrm flipV="1">
-            <a:off x="5506220" y="3415678"/>
+            <a:off x="5506220" y="3228109"/>
             <a:ext cx="243369" cy="1"/>
           </a:xfrm>
           <a:prstGeom prst="straightConnector1">
@@ -7248,7 +7272,7 @@
         </p:nvSpPr>
         <p:spPr>
           <a:xfrm>
-            <a:off x="5948713" y="3307826"/>
+            <a:off x="5948713" y="3120257"/>
             <a:ext cx="243369" cy="211572"/>
           </a:xfrm>
           <a:prstGeom prst="rect">
@@ -7307,7 +7331,7 @@
         </p:nvCxnSpPr>
         <p:spPr>
           <a:xfrm flipV="1">
-            <a:off x="5506220" y="3717401"/>
+            <a:off x="5506220" y="3529832"/>
             <a:ext cx="243369" cy="1"/>
           </a:xfrm>
           <a:prstGeom prst="straightConnector1">
@@ -7349,7 +7373,7 @@
         </p:nvSpPr>
         <p:spPr>
           <a:xfrm>
-            <a:off x="5948713" y="3609549"/>
+            <a:off x="5948713" y="3421980"/>
             <a:ext cx="243369" cy="211572"/>
           </a:xfrm>
           <a:prstGeom prst="rect">
@@ -7408,7 +7432,7 @@
         </p:nvCxnSpPr>
         <p:spPr>
           <a:xfrm flipV="1">
-            <a:off x="5506220" y="4020231"/>
+            <a:off x="5506220" y="3832662"/>
             <a:ext cx="243369" cy="1"/>
           </a:xfrm>
           <a:prstGeom prst="straightConnector1">
@@ -7450,7 +7474,7 @@
         </p:nvSpPr>
         <p:spPr>
           <a:xfrm>
-            <a:off x="5948713" y="3912379"/>
+            <a:off x="5948713" y="3724810"/>
             <a:ext cx="243369" cy="211572"/>
           </a:xfrm>
           <a:prstGeom prst="rect">
@@ -7509,7 +7533,7 @@
         </p:nvCxnSpPr>
         <p:spPr>
           <a:xfrm flipV="1">
-            <a:off x="5506220" y="4323061"/>
+            <a:off x="5506220" y="4135492"/>
             <a:ext cx="243369" cy="1"/>
           </a:xfrm>
           <a:prstGeom prst="straightConnector1">
@@ -7551,7 +7575,7 @@
         </p:nvSpPr>
         <p:spPr>
           <a:xfrm>
-            <a:off x="5948713" y="4215209"/>
+            <a:off x="5948713" y="4027640"/>
             <a:ext cx="243369" cy="211572"/>
           </a:xfrm>
           <a:prstGeom prst="rect">
@@ -7610,7 +7634,7 @@
         </p:nvCxnSpPr>
         <p:spPr>
           <a:xfrm flipV="1">
-            <a:off x="5506220" y="4625890"/>
+            <a:off x="5506220" y="4438321"/>
             <a:ext cx="243369" cy="1"/>
           </a:xfrm>
           <a:prstGeom prst="straightConnector1">
@@ -7652,7 +7676,7 @@
         </p:nvSpPr>
         <p:spPr>
           <a:xfrm>
-            <a:off x="5948713" y="4518038"/>
+            <a:off x="5948713" y="4330469"/>
             <a:ext cx="243369" cy="211572"/>
           </a:xfrm>
           <a:prstGeom prst="rect">
@@ -7711,7 +7735,7 @@
         </p:nvCxnSpPr>
         <p:spPr>
           <a:xfrm flipV="1">
-            <a:off x="5506220" y="4931215"/>
+            <a:off x="5506220" y="4743646"/>
             <a:ext cx="243369" cy="1"/>
           </a:xfrm>
           <a:prstGeom prst="straightConnector1">
@@ -7753,7 +7777,7 @@
         </p:nvSpPr>
         <p:spPr>
           <a:xfrm>
-            <a:off x="5948713" y="4823363"/>
+            <a:off x="5948713" y="4635794"/>
             <a:ext cx="243369" cy="211572"/>
           </a:xfrm>
           <a:prstGeom prst="rect">
@@ -7812,7 +7836,7 @@
         </p:nvCxnSpPr>
         <p:spPr>
           <a:xfrm flipV="1">
-            <a:off x="5506220" y="5221851"/>
+            <a:off x="5506220" y="5034282"/>
             <a:ext cx="243369" cy="1"/>
           </a:xfrm>
           <a:prstGeom prst="straightConnector1">
@@ -7854,7 +7878,7 @@
         </p:nvSpPr>
         <p:spPr>
           <a:xfrm>
-            <a:off x="5948713" y="5113999"/>
+            <a:off x="5948713" y="4926430"/>
             <a:ext cx="243369" cy="211572"/>
           </a:xfrm>
           <a:prstGeom prst="rect">
@@ -7913,7 +7937,7 @@
         </p:nvSpPr>
         <p:spPr>
           <a:xfrm>
-            <a:off x="3633216" y="5433423"/>
+            <a:off x="3633216" y="5245854"/>
             <a:ext cx="1873004" cy="211625"/>
           </a:xfrm>
           <a:prstGeom prst="rect">
@@ -7972,7 +7996,7 @@
         </p:nvCxnSpPr>
         <p:spPr>
           <a:xfrm flipV="1">
-            <a:off x="5506220" y="5537378"/>
+            <a:off x="5506220" y="5349809"/>
             <a:ext cx="243369" cy="1"/>
           </a:xfrm>
           <a:prstGeom prst="straightConnector1">
@@ -8014,7 +8038,7 @@
         </p:nvSpPr>
         <p:spPr>
           <a:xfrm>
-            <a:off x="5948713" y="5429526"/>
+            <a:off x="5948713" y="5241957"/>
             <a:ext cx="243369" cy="211572"/>
           </a:xfrm>
           <a:prstGeom prst="rect">
@@ -8073,7 +8097,7 @@
         </p:nvSpPr>
         <p:spPr>
           <a:xfrm>
-            <a:off x="3633216" y="5743142"/>
+            <a:off x="3633216" y="5555573"/>
             <a:ext cx="1873004" cy="211625"/>
           </a:xfrm>
           <a:prstGeom prst="rect">
@@ -8132,7 +8156,7 @@
         </p:nvCxnSpPr>
         <p:spPr>
           <a:xfrm flipV="1">
-            <a:off x="5506220" y="5847097"/>
+            <a:off x="5506220" y="5659528"/>
             <a:ext cx="243369" cy="1"/>
           </a:xfrm>
           <a:prstGeom prst="straightConnector1">
@@ -8174,7 +8198,7 @@
         </p:nvSpPr>
         <p:spPr>
           <a:xfrm>
-            <a:off x="5948713" y="5739245"/>
+            <a:off x="5948713" y="5551676"/>
             <a:ext cx="243369" cy="211572"/>
           </a:xfrm>
           <a:prstGeom prst="rect">
@@ -8215,6 +8239,166 @@
                 <a:latin typeface="Century Gothic" panose="020B0502020202020204" pitchFamily="34" charset="0"/>
               </a:rPr>
               <a:t>15</a:t>
+            </a:r>
+          </a:p>
+        </p:txBody>
+      </p:sp>
+      <p:sp>
+        <p:nvSpPr>
+          <p:cNvPr id="17" name="Rectangle 16">
+            <a:extLst>
+              <a:ext uri="{FF2B5EF4-FFF2-40B4-BE49-F238E27FC236}">
+                <a16:creationId xmlns:a16="http://schemas.microsoft.com/office/drawing/2014/main" id="{70DCF60A-7CB7-E01E-EF4F-1CBECA2A6769}"/>
+              </a:ext>
+            </a:extLst>
+          </p:cNvPr>
+          <p:cNvSpPr/>
+          <p:nvPr/>
+        </p:nvSpPr>
+        <p:spPr>
+          <a:xfrm>
+            <a:off x="3633216" y="5871153"/>
+            <a:ext cx="1873004" cy="211625"/>
+          </a:xfrm>
+          <a:prstGeom prst="rect">
+            <a:avLst/>
+          </a:prstGeom>
+          <a:solidFill>
+            <a:schemeClr val="tx2"/>
+          </a:solidFill>
+          <a:ln>
+            <a:solidFill>
+              <a:schemeClr val="tx1"/>
+            </a:solidFill>
+          </a:ln>
+        </p:spPr>
+        <p:style>
+          <a:lnRef idx="2">
+            <a:schemeClr val="accent1">
+              <a:shade val="15000"/>
+            </a:schemeClr>
+          </a:lnRef>
+          <a:fillRef idx="1">
+            <a:schemeClr val="accent1"/>
+          </a:fillRef>
+          <a:effectRef idx="0">
+            <a:schemeClr val="accent1"/>
+          </a:effectRef>
+          <a:fontRef idx="minor">
+            <a:schemeClr val="lt1"/>
+          </a:fontRef>
+        </p:style>
+        <p:txBody>
+          <a:bodyPr rtlCol="0" anchor="ctr"/>
+          <a:lstStyle/>
+          <a:p>
+            <a:pPr algn="ctr"/>
+            <a:r>
+              <a:rPr lang="en-US" sz="750" b="1" dirty="0">
+                <a:latin typeface="Century Gothic" panose="020B0502020202020204" pitchFamily="34" charset="0"/>
+              </a:rPr>
+              <a:t>Folder Path</a:t>
+            </a:r>
+          </a:p>
+        </p:txBody>
+      </p:sp>
+      <p:cxnSp>
+        <p:nvCxnSpPr>
+          <p:cNvPr id="18" name="Straight Arrow Connector 17">
+            <a:extLst>
+              <a:ext uri="{FF2B5EF4-FFF2-40B4-BE49-F238E27FC236}">
+                <a16:creationId xmlns:a16="http://schemas.microsoft.com/office/drawing/2014/main" id="{27060DE7-4582-9124-3AFC-FAC0194A14DE}"/>
+              </a:ext>
+            </a:extLst>
+          </p:cNvPr>
+          <p:cNvCxnSpPr/>
+          <p:nvPr/>
+        </p:nvCxnSpPr>
+        <p:spPr>
+          <a:xfrm flipV="1">
+            <a:off x="5506220" y="5975108"/>
+            <a:ext cx="243369" cy="1"/>
+          </a:xfrm>
+          <a:prstGeom prst="straightConnector1">
+            <a:avLst/>
+          </a:prstGeom>
+          <a:ln>
+            <a:solidFill>
+              <a:schemeClr val="tx2"/>
+            </a:solidFill>
+            <a:tailEnd type="triangle"/>
+          </a:ln>
+        </p:spPr>
+        <p:style>
+          <a:lnRef idx="1">
+            <a:schemeClr val="accent1"/>
+          </a:lnRef>
+          <a:fillRef idx="0">
+            <a:schemeClr val="accent1"/>
+          </a:fillRef>
+          <a:effectRef idx="0">
+            <a:schemeClr val="accent1"/>
+          </a:effectRef>
+          <a:fontRef idx="minor">
+            <a:schemeClr val="tx1"/>
+          </a:fontRef>
+        </p:style>
+      </p:cxnSp>
+      <p:sp>
+        <p:nvSpPr>
+          <p:cNvPr id="19" name="Rectangle 18">
+            <a:extLst>
+              <a:ext uri="{FF2B5EF4-FFF2-40B4-BE49-F238E27FC236}">
+                <a16:creationId xmlns:a16="http://schemas.microsoft.com/office/drawing/2014/main" id="{5061B1AA-9770-7FAC-17D6-92FCAEAABA71}"/>
+              </a:ext>
+            </a:extLst>
+          </p:cNvPr>
+          <p:cNvSpPr/>
+          <p:nvPr/>
+        </p:nvSpPr>
+        <p:spPr>
+          <a:xfrm>
+            <a:off x="5948713" y="5867256"/>
+            <a:ext cx="243369" cy="211572"/>
+          </a:xfrm>
+          <a:prstGeom prst="rect">
+            <a:avLst/>
+          </a:prstGeom>
+          <a:solidFill>
+            <a:schemeClr val="tx2"/>
+          </a:solidFill>
+          <a:ln>
+            <a:solidFill>
+              <a:schemeClr val="tx1"/>
+            </a:solidFill>
+          </a:ln>
+        </p:spPr>
+        <p:style>
+          <a:lnRef idx="2">
+            <a:schemeClr val="accent1">
+              <a:shade val="15000"/>
+            </a:schemeClr>
+          </a:lnRef>
+          <a:fillRef idx="1">
+            <a:schemeClr val="accent1"/>
+          </a:fillRef>
+          <a:effectRef idx="0">
+            <a:schemeClr val="accent1"/>
+          </a:effectRef>
+          <a:fontRef idx="minor">
+            <a:schemeClr val="lt1"/>
+          </a:fontRef>
+        </p:style>
+        <p:txBody>
+          <a:bodyPr rtlCol="0" anchor="ctr"/>
+          <a:lstStyle/>
+          <a:p>
+            <a:pPr algn="ctr"/>
+            <a:r>
+              <a:rPr lang="en-US" sz="400" b="1" dirty="0">
+                <a:latin typeface="Century Gothic" panose="020B0502020202020204" pitchFamily="34" charset="0"/>
+              </a:rPr>
+              <a:t>16</a:t>
             </a:r>
           </a:p>
         </p:txBody>

</xml_diff>

<commit_message>
changed the path feature to auto read abs path
</commit_message>
<xml_diff>
--- a/Flow_charts.pptx
+++ b/Flow_charts.pptx
@@ -133,13 +133,13 @@
 <pc:chgInfo xmlns:a="http://schemas.openxmlformats.org/drawingml/2006/main" xmlns:r="http://schemas.openxmlformats.org/officeDocument/2006/relationships" xmlns:ac="http://schemas.microsoft.com/office/drawing/2013/main/command" xmlns:pc="http://schemas.microsoft.com/office/powerpoint/2013/main/command">
   <pc:docChgLst>
     <pc:chgData name="Martin Lemaire" userId="66f74907ca5c5339" providerId="LiveId" clId="{A688B22F-FD12-774C-9247-F3FA9836F7D0}"/>
-    <pc:docChg chg="modSld">
-      <pc:chgData name="Martin Lemaire" userId="66f74907ca5c5339" providerId="LiveId" clId="{A688B22F-FD12-774C-9247-F3FA9836F7D0}" dt="2023-11-10T18:09:10.940" v="46" actId="1076"/>
+    <pc:docChg chg="custSel modSld">
+      <pc:chgData name="Martin Lemaire" userId="66f74907ca5c5339" providerId="LiveId" clId="{A688B22F-FD12-774C-9247-F3FA9836F7D0}" dt="2023-11-10T18:50:17.021" v="47" actId="478"/>
       <pc:docMkLst>
         <pc:docMk/>
       </pc:docMkLst>
-      <pc:sldChg chg="addSp modSp mod">
-        <pc:chgData name="Martin Lemaire" userId="66f74907ca5c5339" providerId="LiveId" clId="{A688B22F-FD12-774C-9247-F3FA9836F7D0}" dt="2023-11-10T18:09:10.940" v="46" actId="1076"/>
+      <pc:sldChg chg="addSp delSp modSp mod">
+        <pc:chgData name="Martin Lemaire" userId="66f74907ca5c5339" providerId="LiveId" clId="{A688B22F-FD12-774C-9247-F3FA9836F7D0}" dt="2023-11-10T18:50:17.021" v="47" actId="478"/>
         <pc:sldMkLst>
           <pc:docMk/>
           <pc:sldMk cId="3780971538" sldId="261"/>
@@ -248,16 +248,16 @@
             <ac:spMk id="16" creationId="{CFEBDE09-A221-F2C1-C03F-FCC4E79A813E}"/>
           </ac:spMkLst>
         </pc:spChg>
-        <pc:spChg chg="add mod">
-          <ac:chgData name="Martin Lemaire" userId="66f74907ca5c5339" providerId="LiveId" clId="{A688B22F-FD12-774C-9247-F3FA9836F7D0}" dt="2023-11-10T18:09:10.940" v="46" actId="1076"/>
+        <pc:spChg chg="add del mod">
+          <ac:chgData name="Martin Lemaire" userId="66f74907ca5c5339" providerId="LiveId" clId="{A688B22F-FD12-774C-9247-F3FA9836F7D0}" dt="2023-11-10T18:50:17.021" v="47" actId="478"/>
           <ac:spMkLst>
             <pc:docMk/>
             <pc:sldMk cId="3780971538" sldId="261"/>
             <ac:spMk id="17" creationId="{70DCF60A-7CB7-E01E-EF4F-1CBECA2A6769}"/>
           </ac:spMkLst>
         </pc:spChg>
-        <pc:spChg chg="add mod">
-          <ac:chgData name="Martin Lemaire" userId="66f74907ca5c5339" providerId="LiveId" clId="{A688B22F-FD12-774C-9247-F3FA9836F7D0}" dt="2023-11-10T18:09:10.940" v="46" actId="1076"/>
+        <pc:spChg chg="add del mod">
+          <ac:chgData name="Martin Lemaire" userId="66f74907ca5c5339" providerId="LiveId" clId="{A688B22F-FD12-774C-9247-F3FA9836F7D0}" dt="2023-11-10T18:50:17.021" v="47" actId="478"/>
           <ac:spMkLst>
             <pc:docMk/>
             <pc:sldMk cId="3780971538" sldId="261"/>
@@ -424,8 +424,8 @@
             <ac:cxnSpMk id="5" creationId="{06DFE8C9-42FE-4CDB-F0DF-E5B51822A5A0}"/>
           </ac:cxnSpMkLst>
         </pc:cxnChg>
-        <pc:cxnChg chg="add mod">
-          <ac:chgData name="Martin Lemaire" userId="66f74907ca5c5339" providerId="LiveId" clId="{A688B22F-FD12-774C-9247-F3FA9836F7D0}" dt="2023-11-10T18:09:10.940" v="46" actId="1076"/>
+        <pc:cxnChg chg="add del mod">
+          <ac:chgData name="Martin Lemaire" userId="66f74907ca5c5339" providerId="LiveId" clId="{A688B22F-FD12-774C-9247-F3FA9836F7D0}" dt="2023-11-10T18:50:17.021" v="47" actId="478"/>
           <ac:cxnSpMkLst>
             <pc:docMk/>
             <pc:sldMk cId="3780971538" sldId="261"/>
@@ -8243,166 +8243,6 @@
           </a:p>
         </p:txBody>
       </p:sp>
-      <p:sp>
-        <p:nvSpPr>
-          <p:cNvPr id="17" name="Rectangle 16">
-            <a:extLst>
-              <a:ext uri="{FF2B5EF4-FFF2-40B4-BE49-F238E27FC236}">
-                <a16:creationId xmlns:a16="http://schemas.microsoft.com/office/drawing/2014/main" id="{70DCF60A-7CB7-E01E-EF4F-1CBECA2A6769}"/>
-              </a:ext>
-            </a:extLst>
-          </p:cNvPr>
-          <p:cNvSpPr/>
-          <p:nvPr/>
-        </p:nvSpPr>
-        <p:spPr>
-          <a:xfrm>
-            <a:off x="3633216" y="5871153"/>
-            <a:ext cx="1873004" cy="211625"/>
-          </a:xfrm>
-          <a:prstGeom prst="rect">
-            <a:avLst/>
-          </a:prstGeom>
-          <a:solidFill>
-            <a:schemeClr val="tx2"/>
-          </a:solidFill>
-          <a:ln>
-            <a:solidFill>
-              <a:schemeClr val="tx1"/>
-            </a:solidFill>
-          </a:ln>
-        </p:spPr>
-        <p:style>
-          <a:lnRef idx="2">
-            <a:schemeClr val="accent1">
-              <a:shade val="15000"/>
-            </a:schemeClr>
-          </a:lnRef>
-          <a:fillRef idx="1">
-            <a:schemeClr val="accent1"/>
-          </a:fillRef>
-          <a:effectRef idx="0">
-            <a:schemeClr val="accent1"/>
-          </a:effectRef>
-          <a:fontRef idx="minor">
-            <a:schemeClr val="lt1"/>
-          </a:fontRef>
-        </p:style>
-        <p:txBody>
-          <a:bodyPr rtlCol="0" anchor="ctr"/>
-          <a:lstStyle/>
-          <a:p>
-            <a:pPr algn="ctr"/>
-            <a:r>
-              <a:rPr lang="en-US" sz="750" b="1" dirty="0">
-                <a:latin typeface="Century Gothic" panose="020B0502020202020204" pitchFamily="34" charset="0"/>
-              </a:rPr>
-              <a:t>Folder Path</a:t>
-            </a:r>
-          </a:p>
-        </p:txBody>
-      </p:sp>
-      <p:cxnSp>
-        <p:nvCxnSpPr>
-          <p:cNvPr id="18" name="Straight Arrow Connector 17">
-            <a:extLst>
-              <a:ext uri="{FF2B5EF4-FFF2-40B4-BE49-F238E27FC236}">
-                <a16:creationId xmlns:a16="http://schemas.microsoft.com/office/drawing/2014/main" id="{27060DE7-4582-9124-3AFC-FAC0194A14DE}"/>
-              </a:ext>
-            </a:extLst>
-          </p:cNvPr>
-          <p:cNvCxnSpPr/>
-          <p:nvPr/>
-        </p:nvCxnSpPr>
-        <p:spPr>
-          <a:xfrm flipV="1">
-            <a:off x="5506220" y="5975108"/>
-            <a:ext cx="243369" cy="1"/>
-          </a:xfrm>
-          <a:prstGeom prst="straightConnector1">
-            <a:avLst/>
-          </a:prstGeom>
-          <a:ln>
-            <a:solidFill>
-              <a:schemeClr val="tx2"/>
-            </a:solidFill>
-            <a:tailEnd type="triangle"/>
-          </a:ln>
-        </p:spPr>
-        <p:style>
-          <a:lnRef idx="1">
-            <a:schemeClr val="accent1"/>
-          </a:lnRef>
-          <a:fillRef idx="0">
-            <a:schemeClr val="accent1"/>
-          </a:fillRef>
-          <a:effectRef idx="0">
-            <a:schemeClr val="accent1"/>
-          </a:effectRef>
-          <a:fontRef idx="minor">
-            <a:schemeClr val="tx1"/>
-          </a:fontRef>
-        </p:style>
-      </p:cxnSp>
-      <p:sp>
-        <p:nvSpPr>
-          <p:cNvPr id="19" name="Rectangle 18">
-            <a:extLst>
-              <a:ext uri="{FF2B5EF4-FFF2-40B4-BE49-F238E27FC236}">
-                <a16:creationId xmlns:a16="http://schemas.microsoft.com/office/drawing/2014/main" id="{5061B1AA-9770-7FAC-17D6-92FCAEAABA71}"/>
-              </a:ext>
-            </a:extLst>
-          </p:cNvPr>
-          <p:cNvSpPr/>
-          <p:nvPr/>
-        </p:nvSpPr>
-        <p:spPr>
-          <a:xfrm>
-            <a:off x="5948713" y="5867256"/>
-            <a:ext cx="243369" cy="211572"/>
-          </a:xfrm>
-          <a:prstGeom prst="rect">
-            <a:avLst/>
-          </a:prstGeom>
-          <a:solidFill>
-            <a:schemeClr val="tx2"/>
-          </a:solidFill>
-          <a:ln>
-            <a:solidFill>
-              <a:schemeClr val="tx1"/>
-            </a:solidFill>
-          </a:ln>
-        </p:spPr>
-        <p:style>
-          <a:lnRef idx="2">
-            <a:schemeClr val="accent1">
-              <a:shade val="15000"/>
-            </a:schemeClr>
-          </a:lnRef>
-          <a:fillRef idx="1">
-            <a:schemeClr val="accent1"/>
-          </a:fillRef>
-          <a:effectRef idx="0">
-            <a:schemeClr val="accent1"/>
-          </a:effectRef>
-          <a:fontRef idx="minor">
-            <a:schemeClr val="lt1"/>
-          </a:fontRef>
-        </p:style>
-        <p:txBody>
-          <a:bodyPr rtlCol="0" anchor="ctr"/>
-          <a:lstStyle/>
-          <a:p>
-            <a:pPr algn="ctr"/>
-            <a:r>
-              <a:rPr lang="en-US" sz="400" b="1" dirty="0">
-                <a:latin typeface="Century Gothic" panose="020B0502020202020204" pitchFamily="34" charset="0"/>
-              </a:rPr>
-              <a:t>16</a:t>
-            </a:r>
-          </a:p>
-        </p:txBody>
-      </p:sp>
     </p:spTree>
     <p:extLst>
       <p:ext uri="{BB962C8B-B14F-4D97-AF65-F5344CB8AC3E}">

</xml_diff>